<commit_message>
ajout stat alpha beta et temps
</commit_message>
<xml_diff>
--- a/ALIA_Othello FINAL.pptx
+++ b/ALIA_Othello FINAL.pptx
@@ -5,7 +5,7 @@
     <p:sldMasterId id="2147483661" r:id="rId1"/>
   </p:sldMasterIdLst>
   <p:notesMasterIdLst>
-    <p:notesMasterId r:id="rId20"/>
+    <p:notesMasterId r:id="rId21"/>
   </p:notesMasterIdLst>
   <p:sldIdLst>
     <p:sldId id="256" r:id="rId2"/>
@@ -23,30 +23,31 @@
     <p:sldId id="316" r:id="rId14"/>
     <p:sldId id="295" r:id="rId15"/>
     <p:sldId id="310" r:id="rId16"/>
-    <p:sldId id="314" r:id="rId17"/>
-    <p:sldId id="311" r:id="rId18"/>
-    <p:sldId id="296" r:id="rId19"/>
+    <p:sldId id="317" r:id="rId17"/>
+    <p:sldId id="314" r:id="rId18"/>
+    <p:sldId id="311" r:id="rId19"/>
+    <p:sldId id="296" r:id="rId20"/>
   </p:sldIdLst>
   <p:sldSz cx="9144000" cy="5143500" type="screen16x9"/>
   <p:notesSz cx="6858000" cy="9144000"/>
   <p:embeddedFontLst>
     <p:embeddedFont>
       <p:font typeface="Roboto" panose="02000000000000000000" pitchFamily="2" charset="0"/>
-      <p:regular r:id="rId21"/>
-      <p:bold r:id="rId22"/>
-      <p:italic r:id="rId23"/>
-      <p:boldItalic r:id="rId24"/>
+      <p:regular r:id="rId22"/>
+      <p:bold r:id="rId23"/>
+      <p:italic r:id="rId24"/>
+      <p:boldItalic r:id="rId25"/>
     </p:embeddedFont>
     <p:embeddedFont>
       <p:font typeface="Roboto Condensed" panose="02000000000000000000" pitchFamily="2" charset="0"/>
-      <p:regular r:id="rId25"/>
-      <p:bold r:id="rId26"/>
-      <p:italic r:id="rId27"/>
-      <p:boldItalic r:id="rId28"/>
+      <p:regular r:id="rId26"/>
+      <p:bold r:id="rId27"/>
+      <p:italic r:id="rId28"/>
+      <p:boldItalic r:id="rId29"/>
     </p:embeddedFont>
     <p:embeddedFont>
       <p:font typeface="Squada One" panose="020B0604020202020204" charset="0"/>
-      <p:regular r:id="rId29"/>
+      <p:regular r:id="rId30"/>
     </p:embeddedFont>
   </p:embeddedFontLst>
   <p:defaultTextStyle>
@@ -1651,7 +1652,7 @@
             </a:pPr>
             <a:fld id="{00000000-1234-1234-1234-123412341234}" type="slidenum">
               <a:rPr lang="en-GB"/>
-              <a:t>‹#›</a:t>
+              <a:t>‹N°›</a:t>
             </a:fld>
             <a:endParaRPr/>
           </a:p>
@@ -2043,7 +2044,7 @@
             </a:pPr>
             <a:fld id="{00000000-1234-1234-1234-123412341234}" type="slidenum">
               <a:rPr lang="en-GB"/>
-              <a:t>‹#›</a:t>
+              <a:t>‹N°›</a:t>
             </a:fld>
             <a:endParaRPr/>
           </a:p>
@@ -2147,7 +2148,7 @@
             </a:pPr>
             <a:fld id="{00000000-1234-1234-1234-123412341234}" type="slidenum">
               <a:rPr lang="en-GB"/>
-              <a:t>‹#›</a:t>
+              <a:t>‹N°›</a:t>
             </a:fld>
             <a:endParaRPr/>
           </a:p>
@@ -2380,7 +2381,7 @@
             </a:pPr>
             <a:fld id="{00000000-1234-1234-1234-123412341234}" type="slidenum">
               <a:rPr lang="en-GB"/>
-              <a:t>‹#›</a:t>
+              <a:t>‹N°›</a:t>
             </a:fld>
             <a:endParaRPr/>
           </a:p>
@@ -2742,7 +2743,7 @@
             </a:pPr>
             <a:fld id="{00000000-1234-1234-1234-123412341234}" type="slidenum">
               <a:rPr lang="en-GB"/>
-              <a:t>‹#›</a:t>
+              <a:t>‹N°›</a:t>
             </a:fld>
             <a:endParaRPr/>
           </a:p>
@@ -3233,7 +3234,7 @@
             </a:pPr>
             <a:fld id="{00000000-1234-1234-1234-123412341234}" type="slidenum">
               <a:rPr lang="en-GB"/>
-              <a:t>‹#›</a:t>
+              <a:t>‹N°›</a:t>
             </a:fld>
             <a:endParaRPr/>
           </a:p>
@@ -3466,7 +3467,7 @@
             </a:pPr>
             <a:fld id="{00000000-1234-1234-1234-123412341234}" type="slidenum">
               <a:rPr lang="en-GB"/>
-              <a:t>‹#›</a:t>
+              <a:t>‹N°›</a:t>
             </a:fld>
             <a:endParaRPr/>
           </a:p>
@@ -3828,7 +3829,7 @@
             </a:pPr>
             <a:fld id="{00000000-1234-1234-1234-123412341234}" type="slidenum">
               <a:rPr lang="en-GB"/>
-              <a:t>‹#›</a:t>
+              <a:t>‹N°›</a:t>
             </a:fld>
             <a:endParaRPr/>
           </a:p>
@@ -4061,7 +4062,7 @@
             </a:pPr>
             <a:fld id="{00000000-1234-1234-1234-123412341234}" type="slidenum">
               <a:rPr lang="en-GB"/>
-              <a:t>‹#›</a:t>
+              <a:t>‹N°›</a:t>
             </a:fld>
             <a:endParaRPr/>
           </a:p>
@@ -4619,7 +4620,7 @@
             </a:pPr>
             <a:fld id="{00000000-1234-1234-1234-123412341234}" type="slidenum">
               <a:rPr lang="en-GB"/>
-              <a:t>‹#›</a:t>
+              <a:t>‹N°›</a:t>
             </a:fld>
             <a:endParaRPr/>
           </a:p>
@@ -4767,7 +4768,7 @@
             </a:pPr>
             <a:fld id="{00000000-1234-1234-1234-123412341234}" type="slidenum">
               <a:rPr lang="en-GB"/>
-              <a:t>‹#›</a:t>
+              <a:t>‹N°›</a:t>
             </a:fld>
             <a:endParaRPr/>
           </a:p>
@@ -5424,7 +5425,7 @@
             </a:pPr>
             <a:fld id="{00000000-1234-1234-1234-123412341234}" type="slidenum">
               <a:rPr lang="en-GB"/>
-              <a:t>‹#›</a:t>
+              <a:t>‹N°›</a:t>
             </a:fld>
             <a:endParaRPr/>
           </a:p>
@@ -19316,6 +19317,1321 @@
           <a:chExt cx="0" cy="0"/>
         </a:xfrm>
       </p:grpSpPr>
+      <p:sp>
+        <p:nvSpPr>
+          <p:cNvPr id="3" name="Google Shape;808;p33">
+            <a:extLst>
+              <a:ext uri="{FF2B5EF4-FFF2-40B4-BE49-F238E27FC236}">
+                <a16:creationId xmlns:a16="http://schemas.microsoft.com/office/drawing/2014/main" id="{A3481AAC-814A-4B89-8B66-B88E4960F246}"/>
+              </a:ext>
+            </a:extLst>
+          </p:cNvPr>
+          <p:cNvSpPr/>
+          <p:nvPr/>
+        </p:nvSpPr>
+        <p:spPr>
+          <a:xfrm rot="-5400000">
+            <a:off x="291694" y="269698"/>
+            <a:ext cx="1091700" cy="945600"/>
+          </a:xfrm>
+          <a:prstGeom prst="hexagon">
+            <a:avLst>
+              <a:gd name="adj" fmla="val 28729"/>
+              <a:gd name="vf" fmla="val 115470"/>
+            </a:avLst>
+          </a:prstGeom>
+          <a:gradFill>
+            <a:gsLst>
+              <a:gs pos="0">
+                <a:srgbClr val="FFFFFF">
+                  <a:alpha val="0"/>
+                  <a:alpha val="58430"/>
+                </a:srgbClr>
+              </a:gs>
+              <a:gs pos="100000">
+                <a:srgbClr val="FFFFFF">
+                  <a:alpha val="39215"/>
+                  <a:alpha val="58430"/>
+                </a:srgbClr>
+              </a:gs>
+            </a:gsLst>
+            <a:path path="circle">
+              <a:fillToRect l="50000" t="50000" r="50000" b="50000"/>
+            </a:path>
+            <a:tileRect/>
+          </a:gradFill>
+          <a:ln w="19050" cap="flat" cmpd="sng">
+            <a:solidFill>
+              <a:schemeClr val="lt1"/>
+            </a:solidFill>
+            <a:prstDash val="solid"/>
+            <a:round/>
+            <a:headEnd type="none" w="sm" len="sm"/>
+            <a:tailEnd type="none" w="sm" len="sm"/>
+          </a:ln>
+        </p:spPr>
+        <p:txBody>
+          <a:bodyPr spcFirstLastPara="1" wrap="square" lIns="91425" tIns="91425" rIns="91425" bIns="91425" anchor="ctr" anchorCtr="0">
+            <a:noAutofit/>
+          </a:bodyPr>
+          <a:lstStyle>
+            <a:defPPr marR="0" lvl="0" algn="l" rtl="0">
+              <a:lnSpc>
+                <a:spcPct val="100000"/>
+              </a:lnSpc>
+              <a:spcBef>
+                <a:spcPts val="0"/>
+              </a:spcBef>
+              <a:spcAft>
+                <a:spcPts val="0"/>
+              </a:spcAft>
+            </a:defPPr>
+            <a:lvl1pPr marR="0" lvl="0" algn="l" rtl="0">
+              <a:lnSpc>
+                <a:spcPct val="100000"/>
+              </a:lnSpc>
+              <a:spcBef>
+                <a:spcPts val="0"/>
+              </a:spcBef>
+              <a:spcAft>
+                <a:spcPts val="0"/>
+              </a:spcAft>
+              <a:buClr>
+                <a:srgbClr val="000000"/>
+              </a:buClr>
+              <a:buFont typeface="Arial"/>
+              <a:defRPr sz="1400" b="0" i="0" u="none" strike="noStrike" cap="none">
+                <a:solidFill>
+                  <a:srgbClr val="000000"/>
+                </a:solidFill>
+                <a:latin typeface="Arial"/>
+                <a:ea typeface="Arial"/>
+                <a:cs typeface="Arial"/>
+                <a:sym typeface="Arial"/>
+              </a:defRPr>
+            </a:lvl1pPr>
+            <a:lvl2pPr marR="0" lvl="1" algn="l" rtl="0">
+              <a:lnSpc>
+                <a:spcPct val="100000"/>
+              </a:lnSpc>
+              <a:spcBef>
+                <a:spcPts val="0"/>
+              </a:spcBef>
+              <a:spcAft>
+                <a:spcPts val="0"/>
+              </a:spcAft>
+              <a:buClr>
+                <a:srgbClr val="000000"/>
+              </a:buClr>
+              <a:buFont typeface="Arial"/>
+              <a:defRPr sz="1400" b="0" i="0" u="none" strike="noStrike" cap="none">
+                <a:solidFill>
+                  <a:srgbClr val="000000"/>
+                </a:solidFill>
+                <a:latin typeface="Arial"/>
+                <a:ea typeface="Arial"/>
+                <a:cs typeface="Arial"/>
+                <a:sym typeface="Arial"/>
+              </a:defRPr>
+            </a:lvl2pPr>
+            <a:lvl3pPr marR="0" lvl="2" algn="l" rtl="0">
+              <a:lnSpc>
+                <a:spcPct val="100000"/>
+              </a:lnSpc>
+              <a:spcBef>
+                <a:spcPts val="0"/>
+              </a:spcBef>
+              <a:spcAft>
+                <a:spcPts val="0"/>
+              </a:spcAft>
+              <a:buClr>
+                <a:srgbClr val="000000"/>
+              </a:buClr>
+              <a:buFont typeface="Arial"/>
+              <a:defRPr sz="1400" b="0" i="0" u="none" strike="noStrike" cap="none">
+                <a:solidFill>
+                  <a:srgbClr val="000000"/>
+                </a:solidFill>
+                <a:latin typeface="Arial"/>
+                <a:ea typeface="Arial"/>
+                <a:cs typeface="Arial"/>
+                <a:sym typeface="Arial"/>
+              </a:defRPr>
+            </a:lvl3pPr>
+            <a:lvl4pPr marR="0" lvl="3" algn="l" rtl="0">
+              <a:lnSpc>
+                <a:spcPct val="100000"/>
+              </a:lnSpc>
+              <a:spcBef>
+                <a:spcPts val="0"/>
+              </a:spcBef>
+              <a:spcAft>
+                <a:spcPts val="0"/>
+              </a:spcAft>
+              <a:buClr>
+                <a:srgbClr val="000000"/>
+              </a:buClr>
+              <a:buFont typeface="Arial"/>
+              <a:defRPr sz="1400" b="0" i="0" u="none" strike="noStrike" cap="none">
+                <a:solidFill>
+                  <a:srgbClr val="000000"/>
+                </a:solidFill>
+                <a:latin typeface="Arial"/>
+                <a:ea typeface="Arial"/>
+                <a:cs typeface="Arial"/>
+                <a:sym typeface="Arial"/>
+              </a:defRPr>
+            </a:lvl4pPr>
+            <a:lvl5pPr marR="0" lvl="4" algn="l" rtl="0">
+              <a:lnSpc>
+                <a:spcPct val="100000"/>
+              </a:lnSpc>
+              <a:spcBef>
+                <a:spcPts val="0"/>
+              </a:spcBef>
+              <a:spcAft>
+                <a:spcPts val="0"/>
+              </a:spcAft>
+              <a:buClr>
+                <a:srgbClr val="000000"/>
+              </a:buClr>
+              <a:buFont typeface="Arial"/>
+              <a:defRPr sz="1400" b="0" i="0" u="none" strike="noStrike" cap="none">
+                <a:solidFill>
+                  <a:srgbClr val="000000"/>
+                </a:solidFill>
+                <a:latin typeface="Arial"/>
+                <a:ea typeface="Arial"/>
+                <a:cs typeface="Arial"/>
+                <a:sym typeface="Arial"/>
+              </a:defRPr>
+            </a:lvl5pPr>
+            <a:lvl6pPr marR="0" lvl="5" algn="l" rtl="0">
+              <a:lnSpc>
+                <a:spcPct val="100000"/>
+              </a:lnSpc>
+              <a:spcBef>
+                <a:spcPts val="0"/>
+              </a:spcBef>
+              <a:spcAft>
+                <a:spcPts val="0"/>
+              </a:spcAft>
+              <a:buClr>
+                <a:srgbClr val="000000"/>
+              </a:buClr>
+              <a:buFont typeface="Arial"/>
+              <a:defRPr sz="1400" b="0" i="0" u="none" strike="noStrike" cap="none">
+                <a:solidFill>
+                  <a:srgbClr val="000000"/>
+                </a:solidFill>
+                <a:latin typeface="Arial"/>
+                <a:ea typeface="Arial"/>
+                <a:cs typeface="Arial"/>
+                <a:sym typeface="Arial"/>
+              </a:defRPr>
+            </a:lvl6pPr>
+            <a:lvl7pPr marR="0" lvl="6" algn="l" rtl="0">
+              <a:lnSpc>
+                <a:spcPct val="100000"/>
+              </a:lnSpc>
+              <a:spcBef>
+                <a:spcPts val="0"/>
+              </a:spcBef>
+              <a:spcAft>
+                <a:spcPts val="0"/>
+              </a:spcAft>
+              <a:buClr>
+                <a:srgbClr val="000000"/>
+              </a:buClr>
+              <a:buFont typeface="Arial"/>
+              <a:defRPr sz="1400" b="0" i="0" u="none" strike="noStrike" cap="none">
+                <a:solidFill>
+                  <a:srgbClr val="000000"/>
+                </a:solidFill>
+                <a:latin typeface="Arial"/>
+                <a:ea typeface="Arial"/>
+                <a:cs typeface="Arial"/>
+                <a:sym typeface="Arial"/>
+              </a:defRPr>
+            </a:lvl7pPr>
+            <a:lvl8pPr marR="0" lvl="7" algn="l" rtl="0">
+              <a:lnSpc>
+                <a:spcPct val="100000"/>
+              </a:lnSpc>
+              <a:spcBef>
+                <a:spcPts val="0"/>
+              </a:spcBef>
+              <a:spcAft>
+                <a:spcPts val="0"/>
+              </a:spcAft>
+              <a:buClr>
+                <a:srgbClr val="000000"/>
+              </a:buClr>
+              <a:buFont typeface="Arial"/>
+              <a:defRPr sz="1400" b="0" i="0" u="none" strike="noStrike" cap="none">
+                <a:solidFill>
+                  <a:srgbClr val="000000"/>
+                </a:solidFill>
+                <a:latin typeface="Arial"/>
+                <a:ea typeface="Arial"/>
+                <a:cs typeface="Arial"/>
+                <a:sym typeface="Arial"/>
+              </a:defRPr>
+            </a:lvl8pPr>
+            <a:lvl9pPr marR="0" lvl="8" algn="l" rtl="0">
+              <a:lnSpc>
+                <a:spcPct val="100000"/>
+              </a:lnSpc>
+              <a:spcBef>
+                <a:spcPts val="0"/>
+              </a:spcBef>
+              <a:spcAft>
+                <a:spcPts val="0"/>
+              </a:spcAft>
+              <a:buClr>
+                <a:srgbClr val="000000"/>
+              </a:buClr>
+              <a:buFont typeface="Arial"/>
+              <a:defRPr sz="1400" b="0" i="0" u="none" strike="noStrike" cap="none">
+                <a:solidFill>
+                  <a:srgbClr val="000000"/>
+                </a:solidFill>
+                <a:latin typeface="Arial"/>
+                <a:ea typeface="Arial"/>
+                <a:cs typeface="Arial"/>
+                <a:sym typeface="Arial"/>
+              </a:defRPr>
+            </a:lvl9pPr>
+          </a:lstStyle>
+          <a:p>
+            <a:pPr marL="0" marR="0" lvl="0" indent="0" algn="l" rtl="0">
+              <a:lnSpc>
+                <a:spcPct val="100000"/>
+              </a:lnSpc>
+              <a:spcBef>
+                <a:spcPts val="0"/>
+              </a:spcBef>
+              <a:spcAft>
+                <a:spcPts val="0"/>
+              </a:spcAft>
+              <a:buNone/>
+            </a:pPr>
+            <a:endParaRPr/>
+          </a:p>
+        </p:txBody>
+      </p:sp>
+      <p:sp>
+        <p:nvSpPr>
+          <p:cNvPr id="4" name="Google Shape;809;p33">
+            <a:extLst>
+              <a:ext uri="{FF2B5EF4-FFF2-40B4-BE49-F238E27FC236}">
+                <a16:creationId xmlns:a16="http://schemas.microsoft.com/office/drawing/2014/main" id="{E06DD028-D630-4D4A-B083-56673C30B9FD}"/>
+              </a:ext>
+            </a:extLst>
+          </p:cNvPr>
+          <p:cNvSpPr/>
+          <p:nvPr/>
+        </p:nvSpPr>
+        <p:spPr>
+          <a:xfrm rot="10800000" flipH="1">
+            <a:off x="1310344" y="466291"/>
+            <a:ext cx="1723584" cy="552401"/>
+          </a:xfrm>
+          <a:custGeom>
+            <a:avLst/>
+            <a:gdLst/>
+            <a:ahLst/>
+            <a:cxnLst/>
+            <a:rect l="l" t="t" r="r" b="b"/>
+            <a:pathLst>
+              <a:path w="74053" h="26456" extrusionOk="0">
+                <a:moveTo>
+                  <a:pt x="0" y="0"/>
+                </a:moveTo>
+                <a:lnTo>
+                  <a:pt x="66153" y="0"/>
+                </a:lnTo>
+                <a:lnTo>
+                  <a:pt x="74053" y="13216"/>
+                </a:lnTo>
+                <a:lnTo>
+                  <a:pt x="66153" y="26433"/>
+                </a:lnTo>
+                <a:lnTo>
+                  <a:pt x="231" y="26456"/>
+                </a:lnTo>
+                <a:lnTo>
+                  <a:pt x="255" y="26456"/>
+                </a:lnTo>
+              </a:path>
+            </a:pathLst>
+          </a:custGeom>
+          <a:noFill/>
+          <a:ln w="19050" cap="flat" cmpd="sng">
+            <a:solidFill>
+              <a:schemeClr val="lt1"/>
+            </a:solidFill>
+            <a:prstDash val="solid"/>
+            <a:round/>
+            <a:headEnd type="none" w="med" len="med"/>
+            <a:tailEnd type="none" w="med" len="med"/>
+          </a:ln>
+        </p:spPr>
+        <p:txBody>
+          <a:bodyPr/>
+          <a:lstStyle/>
+          <a:p>
+            <a:endParaRPr lang="en-GB"/>
+          </a:p>
+        </p:txBody>
+      </p:sp>
+      <p:sp>
+        <p:nvSpPr>
+          <p:cNvPr id="5" name="Google Shape;810;p33">
+            <a:extLst>
+              <a:ext uri="{FF2B5EF4-FFF2-40B4-BE49-F238E27FC236}">
+                <a16:creationId xmlns:a16="http://schemas.microsoft.com/office/drawing/2014/main" id="{E2CB2DD4-EC4E-415D-8A2A-565FAA738D07}"/>
+              </a:ext>
+            </a:extLst>
+          </p:cNvPr>
+          <p:cNvSpPr txBox="1"/>
+          <p:nvPr/>
+        </p:nvSpPr>
+        <p:spPr>
+          <a:xfrm>
+            <a:off x="1364884" y="568192"/>
+            <a:ext cx="1669044" cy="348600"/>
+          </a:xfrm>
+          <a:prstGeom prst="rect">
+            <a:avLst/>
+          </a:prstGeom>
+          <a:noFill/>
+          <a:ln>
+            <a:noFill/>
+          </a:ln>
+        </p:spPr>
+        <p:txBody>
+          <a:bodyPr spcFirstLastPara="1" wrap="square" lIns="91425" tIns="91425" rIns="91425" bIns="91425" anchor="ctr" anchorCtr="0">
+            <a:noAutofit/>
+          </a:bodyPr>
+          <a:lstStyle>
+            <a:defPPr marR="0" lvl="0" algn="l" rtl="0">
+              <a:lnSpc>
+                <a:spcPct val="100000"/>
+              </a:lnSpc>
+              <a:spcBef>
+                <a:spcPts val="0"/>
+              </a:spcBef>
+              <a:spcAft>
+                <a:spcPts val="0"/>
+              </a:spcAft>
+            </a:defPPr>
+            <a:lvl1pPr marR="0" lvl="0" algn="l" rtl="0">
+              <a:lnSpc>
+                <a:spcPct val="100000"/>
+              </a:lnSpc>
+              <a:spcBef>
+                <a:spcPts val="0"/>
+              </a:spcBef>
+              <a:spcAft>
+                <a:spcPts val="0"/>
+              </a:spcAft>
+              <a:buClr>
+                <a:srgbClr val="000000"/>
+              </a:buClr>
+              <a:buFont typeface="Arial"/>
+              <a:defRPr sz="1400" b="0" i="0" u="none" strike="noStrike" cap="none">
+                <a:solidFill>
+                  <a:srgbClr val="000000"/>
+                </a:solidFill>
+                <a:latin typeface="Arial"/>
+                <a:ea typeface="Arial"/>
+                <a:cs typeface="Arial"/>
+                <a:sym typeface="Arial"/>
+              </a:defRPr>
+            </a:lvl1pPr>
+            <a:lvl2pPr marR="0" lvl="1" algn="l" rtl="0">
+              <a:lnSpc>
+                <a:spcPct val="100000"/>
+              </a:lnSpc>
+              <a:spcBef>
+                <a:spcPts val="0"/>
+              </a:spcBef>
+              <a:spcAft>
+                <a:spcPts val="0"/>
+              </a:spcAft>
+              <a:buClr>
+                <a:srgbClr val="000000"/>
+              </a:buClr>
+              <a:buFont typeface="Arial"/>
+              <a:defRPr sz="1400" b="0" i="0" u="none" strike="noStrike" cap="none">
+                <a:solidFill>
+                  <a:srgbClr val="000000"/>
+                </a:solidFill>
+                <a:latin typeface="Arial"/>
+                <a:ea typeface="Arial"/>
+                <a:cs typeface="Arial"/>
+                <a:sym typeface="Arial"/>
+              </a:defRPr>
+            </a:lvl2pPr>
+            <a:lvl3pPr marR="0" lvl="2" algn="l" rtl="0">
+              <a:lnSpc>
+                <a:spcPct val="100000"/>
+              </a:lnSpc>
+              <a:spcBef>
+                <a:spcPts val="0"/>
+              </a:spcBef>
+              <a:spcAft>
+                <a:spcPts val="0"/>
+              </a:spcAft>
+              <a:buClr>
+                <a:srgbClr val="000000"/>
+              </a:buClr>
+              <a:buFont typeface="Arial"/>
+              <a:defRPr sz="1400" b="0" i="0" u="none" strike="noStrike" cap="none">
+                <a:solidFill>
+                  <a:srgbClr val="000000"/>
+                </a:solidFill>
+                <a:latin typeface="Arial"/>
+                <a:ea typeface="Arial"/>
+                <a:cs typeface="Arial"/>
+                <a:sym typeface="Arial"/>
+              </a:defRPr>
+            </a:lvl3pPr>
+            <a:lvl4pPr marR="0" lvl="3" algn="l" rtl="0">
+              <a:lnSpc>
+                <a:spcPct val="100000"/>
+              </a:lnSpc>
+              <a:spcBef>
+                <a:spcPts val="0"/>
+              </a:spcBef>
+              <a:spcAft>
+                <a:spcPts val="0"/>
+              </a:spcAft>
+              <a:buClr>
+                <a:srgbClr val="000000"/>
+              </a:buClr>
+              <a:buFont typeface="Arial"/>
+              <a:defRPr sz="1400" b="0" i="0" u="none" strike="noStrike" cap="none">
+                <a:solidFill>
+                  <a:srgbClr val="000000"/>
+                </a:solidFill>
+                <a:latin typeface="Arial"/>
+                <a:ea typeface="Arial"/>
+                <a:cs typeface="Arial"/>
+                <a:sym typeface="Arial"/>
+              </a:defRPr>
+            </a:lvl4pPr>
+            <a:lvl5pPr marR="0" lvl="4" algn="l" rtl="0">
+              <a:lnSpc>
+                <a:spcPct val="100000"/>
+              </a:lnSpc>
+              <a:spcBef>
+                <a:spcPts val="0"/>
+              </a:spcBef>
+              <a:spcAft>
+                <a:spcPts val="0"/>
+              </a:spcAft>
+              <a:buClr>
+                <a:srgbClr val="000000"/>
+              </a:buClr>
+              <a:buFont typeface="Arial"/>
+              <a:defRPr sz="1400" b="0" i="0" u="none" strike="noStrike" cap="none">
+                <a:solidFill>
+                  <a:srgbClr val="000000"/>
+                </a:solidFill>
+                <a:latin typeface="Arial"/>
+                <a:ea typeface="Arial"/>
+                <a:cs typeface="Arial"/>
+                <a:sym typeface="Arial"/>
+              </a:defRPr>
+            </a:lvl5pPr>
+            <a:lvl6pPr marR="0" lvl="5" algn="l" rtl="0">
+              <a:lnSpc>
+                <a:spcPct val="100000"/>
+              </a:lnSpc>
+              <a:spcBef>
+                <a:spcPts val="0"/>
+              </a:spcBef>
+              <a:spcAft>
+                <a:spcPts val="0"/>
+              </a:spcAft>
+              <a:buClr>
+                <a:srgbClr val="000000"/>
+              </a:buClr>
+              <a:buFont typeface="Arial"/>
+              <a:defRPr sz="1400" b="0" i="0" u="none" strike="noStrike" cap="none">
+                <a:solidFill>
+                  <a:srgbClr val="000000"/>
+                </a:solidFill>
+                <a:latin typeface="Arial"/>
+                <a:ea typeface="Arial"/>
+                <a:cs typeface="Arial"/>
+                <a:sym typeface="Arial"/>
+              </a:defRPr>
+            </a:lvl6pPr>
+            <a:lvl7pPr marR="0" lvl="6" algn="l" rtl="0">
+              <a:lnSpc>
+                <a:spcPct val="100000"/>
+              </a:lnSpc>
+              <a:spcBef>
+                <a:spcPts val="0"/>
+              </a:spcBef>
+              <a:spcAft>
+                <a:spcPts val="0"/>
+              </a:spcAft>
+              <a:buClr>
+                <a:srgbClr val="000000"/>
+              </a:buClr>
+              <a:buFont typeface="Arial"/>
+              <a:defRPr sz="1400" b="0" i="0" u="none" strike="noStrike" cap="none">
+                <a:solidFill>
+                  <a:srgbClr val="000000"/>
+                </a:solidFill>
+                <a:latin typeface="Arial"/>
+                <a:ea typeface="Arial"/>
+                <a:cs typeface="Arial"/>
+                <a:sym typeface="Arial"/>
+              </a:defRPr>
+            </a:lvl7pPr>
+            <a:lvl8pPr marR="0" lvl="7" algn="l" rtl="0">
+              <a:lnSpc>
+                <a:spcPct val="100000"/>
+              </a:lnSpc>
+              <a:spcBef>
+                <a:spcPts val="0"/>
+              </a:spcBef>
+              <a:spcAft>
+                <a:spcPts val="0"/>
+              </a:spcAft>
+              <a:buClr>
+                <a:srgbClr val="000000"/>
+              </a:buClr>
+              <a:buFont typeface="Arial"/>
+              <a:defRPr sz="1400" b="0" i="0" u="none" strike="noStrike" cap="none">
+                <a:solidFill>
+                  <a:srgbClr val="000000"/>
+                </a:solidFill>
+                <a:latin typeface="Arial"/>
+                <a:ea typeface="Arial"/>
+                <a:cs typeface="Arial"/>
+                <a:sym typeface="Arial"/>
+              </a:defRPr>
+            </a:lvl8pPr>
+            <a:lvl9pPr marR="0" lvl="8" algn="l" rtl="0">
+              <a:lnSpc>
+                <a:spcPct val="100000"/>
+              </a:lnSpc>
+              <a:spcBef>
+                <a:spcPts val="0"/>
+              </a:spcBef>
+              <a:spcAft>
+                <a:spcPts val="0"/>
+              </a:spcAft>
+              <a:buClr>
+                <a:srgbClr val="000000"/>
+              </a:buClr>
+              <a:buFont typeface="Arial"/>
+              <a:defRPr sz="1400" b="0" i="0" u="none" strike="noStrike" cap="none">
+                <a:solidFill>
+                  <a:srgbClr val="000000"/>
+                </a:solidFill>
+                <a:latin typeface="Arial"/>
+                <a:ea typeface="Arial"/>
+                <a:cs typeface="Arial"/>
+                <a:sym typeface="Arial"/>
+              </a:defRPr>
+            </a:lvl9pPr>
+          </a:lstStyle>
+          <a:p>
+            <a:pPr marL="0" lvl="0" indent="0" algn="ctr" rtl="0">
+              <a:spcBef>
+                <a:spcPts val="0"/>
+              </a:spcBef>
+              <a:spcAft>
+                <a:spcPts val="0"/>
+              </a:spcAft>
+              <a:buNone/>
+            </a:pPr>
+            <a:r>
+              <a:rPr lang="en-GB" sz="1800" b="1" dirty="0">
+                <a:solidFill>
+                  <a:schemeClr val="lt1"/>
+                </a:solidFill>
+                <a:latin typeface="Squada One"/>
+                <a:ea typeface="Squada One"/>
+                <a:cs typeface="Squada One"/>
+                <a:sym typeface="Squada One"/>
+              </a:rPr>
+              <a:t>ALPHA-BETA VS MIN-MAX</a:t>
+            </a:r>
+            <a:endParaRPr sz="1800" b="1" dirty="0">
+              <a:solidFill>
+                <a:schemeClr val="lt1"/>
+              </a:solidFill>
+              <a:latin typeface="Squada One"/>
+              <a:ea typeface="Squada One"/>
+              <a:cs typeface="Squada One"/>
+              <a:sym typeface="Squada One"/>
+            </a:endParaRPr>
+          </a:p>
+        </p:txBody>
+      </p:sp>
+      <p:sp>
+        <p:nvSpPr>
+          <p:cNvPr id="6" name="Google Shape;811;p33">
+            <a:extLst>
+              <a:ext uri="{FF2B5EF4-FFF2-40B4-BE49-F238E27FC236}">
+                <a16:creationId xmlns:a16="http://schemas.microsoft.com/office/drawing/2014/main" id="{5F8ABF38-7C1E-4FC3-BF42-FBA2972BA8F4}"/>
+              </a:ext>
+            </a:extLst>
+          </p:cNvPr>
+          <p:cNvSpPr txBox="1"/>
+          <p:nvPr/>
+        </p:nvSpPr>
+        <p:spPr>
+          <a:xfrm>
+            <a:off x="419403" y="568193"/>
+            <a:ext cx="836400" cy="348600"/>
+          </a:xfrm>
+          <a:prstGeom prst="rect">
+            <a:avLst/>
+          </a:prstGeom>
+          <a:noFill/>
+          <a:ln>
+            <a:noFill/>
+          </a:ln>
+        </p:spPr>
+        <p:txBody>
+          <a:bodyPr spcFirstLastPara="1" wrap="square" lIns="91425" tIns="91425" rIns="91425" bIns="91425" anchor="ctr" anchorCtr="0">
+            <a:noAutofit/>
+          </a:bodyPr>
+          <a:lstStyle>
+            <a:defPPr marR="0" lvl="0" algn="l" rtl="0">
+              <a:lnSpc>
+                <a:spcPct val="100000"/>
+              </a:lnSpc>
+              <a:spcBef>
+                <a:spcPts val="0"/>
+              </a:spcBef>
+              <a:spcAft>
+                <a:spcPts val="0"/>
+              </a:spcAft>
+            </a:defPPr>
+            <a:lvl1pPr marR="0" lvl="0" algn="l" rtl="0">
+              <a:lnSpc>
+                <a:spcPct val="100000"/>
+              </a:lnSpc>
+              <a:spcBef>
+                <a:spcPts val="0"/>
+              </a:spcBef>
+              <a:spcAft>
+                <a:spcPts val="0"/>
+              </a:spcAft>
+              <a:buClr>
+                <a:srgbClr val="000000"/>
+              </a:buClr>
+              <a:buFont typeface="Arial"/>
+              <a:defRPr sz="1400" b="0" i="0" u="none" strike="noStrike" cap="none">
+                <a:solidFill>
+                  <a:srgbClr val="000000"/>
+                </a:solidFill>
+                <a:latin typeface="Arial"/>
+                <a:ea typeface="Arial"/>
+                <a:cs typeface="Arial"/>
+                <a:sym typeface="Arial"/>
+              </a:defRPr>
+            </a:lvl1pPr>
+            <a:lvl2pPr marR="0" lvl="1" algn="l" rtl="0">
+              <a:lnSpc>
+                <a:spcPct val="100000"/>
+              </a:lnSpc>
+              <a:spcBef>
+                <a:spcPts val="0"/>
+              </a:spcBef>
+              <a:spcAft>
+                <a:spcPts val="0"/>
+              </a:spcAft>
+              <a:buClr>
+                <a:srgbClr val="000000"/>
+              </a:buClr>
+              <a:buFont typeface="Arial"/>
+              <a:defRPr sz="1400" b="0" i="0" u="none" strike="noStrike" cap="none">
+                <a:solidFill>
+                  <a:srgbClr val="000000"/>
+                </a:solidFill>
+                <a:latin typeface="Arial"/>
+                <a:ea typeface="Arial"/>
+                <a:cs typeface="Arial"/>
+                <a:sym typeface="Arial"/>
+              </a:defRPr>
+            </a:lvl2pPr>
+            <a:lvl3pPr marR="0" lvl="2" algn="l" rtl="0">
+              <a:lnSpc>
+                <a:spcPct val="100000"/>
+              </a:lnSpc>
+              <a:spcBef>
+                <a:spcPts val="0"/>
+              </a:spcBef>
+              <a:spcAft>
+                <a:spcPts val="0"/>
+              </a:spcAft>
+              <a:buClr>
+                <a:srgbClr val="000000"/>
+              </a:buClr>
+              <a:buFont typeface="Arial"/>
+              <a:defRPr sz="1400" b="0" i="0" u="none" strike="noStrike" cap="none">
+                <a:solidFill>
+                  <a:srgbClr val="000000"/>
+                </a:solidFill>
+                <a:latin typeface="Arial"/>
+                <a:ea typeface="Arial"/>
+                <a:cs typeface="Arial"/>
+                <a:sym typeface="Arial"/>
+              </a:defRPr>
+            </a:lvl3pPr>
+            <a:lvl4pPr marR="0" lvl="3" algn="l" rtl="0">
+              <a:lnSpc>
+                <a:spcPct val="100000"/>
+              </a:lnSpc>
+              <a:spcBef>
+                <a:spcPts val="0"/>
+              </a:spcBef>
+              <a:spcAft>
+                <a:spcPts val="0"/>
+              </a:spcAft>
+              <a:buClr>
+                <a:srgbClr val="000000"/>
+              </a:buClr>
+              <a:buFont typeface="Arial"/>
+              <a:defRPr sz="1400" b="0" i="0" u="none" strike="noStrike" cap="none">
+                <a:solidFill>
+                  <a:srgbClr val="000000"/>
+                </a:solidFill>
+                <a:latin typeface="Arial"/>
+                <a:ea typeface="Arial"/>
+                <a:cs typeface="Arial"/>
+                <a:sym typeface="Arial"/>
+              </a:defRPr>
+            </a:lvl4pPr>
+            <a:lvl5pPr marR="0" lvl="4" algn="l" rtl="0">
+              <a:lnSpc>
+                <a:spcPct val="100000"/>
+              </a:lnSpc>
+              <a:spcBef>
+                <a:spcPts val="0"/>
+              </a:spcBef>
+              <a:spcAft>
+                <a:spcPts val="0"/>
+              </a:spcAft>
+              <a:buClr>
+                <a:srgbClr val="000000"/>
+              </a:buClr>
+              <a:buFont typeface="Arial"/>
+              <a:defRPr sz="1400" b="0" i="0" u="none" strike="noStrike" cap="none">
+                <a:solidFill>
+                  <a:srgbClr val="000000"/>
+                </a:solidFill>
+                <a:latin typeface="Arial"/>
+                <a:ea typeface="Arial"/>
+                <a:cs typeface="Arial"/>
+                <a:sym typeface="Arial"/>
+              </a:defRPr>
+            </a:lvl5pPr>
+            <a:lvl6pPr marR="0" lvl="5" algn="l" rtl="0">
+              <a:lnSpc>
+                <a:spcPct val="100000"/>
+              </a:lnSpc>
+              <a:spcBef>
+                <a:spcPts val="0"/>
+              </a:spcBef>
+              <a:spcAft>
+                <a:spcPts val="0"/>
+              </a:spcAft>
+              <a:buClr>
+                <a:srgbClr val="000000"/>
+              </a:buClr>
+              <a:buFont typeface="Arial"/>
+              <a:defRPr sz="1400" b="0" i="0" u="none" strike="noStrike" cap="none">
+                <a:solidFill>
+                  <a:srgbClr val="000000"/>
+                </a:solidFill>
+                <a:latin typeface="Arial"/>
+                <a:ea typeface="Arial"/>
+                <a:cs typeface="Arial"/>
+                <a:sym typeface="Arial"/>
+              </a:defRPr>
+            </a:lvl6pPr>
+            <a:lvl7pPr marR="0" lvl="6" algn="l" rtl="0">
+              <a:lnSpc>
+                <a:spcPct val="100000"/>
+              </a:lnSpc>
+              <a:spcBef>
+                <a:spcPts val="0"/>
+              </a:spcBef>
+              <a:spcAft>
+                <a:spcPts val="0"/>
+              </a:spcAft>
+              <a:buClr>
+                <a:srgbClr val="000000"/>
+              </a:buClr>
+              <a:buFont typeface="Arial"/>
+              <a:defRPr sz="1400" b="0" i="0" u="none" strike="noStrike" cap="none">
+                <a:solidFill>
+                  <a:srgbClr val="000000"/>
+                </a:solidFill>
+                <a:latin typeface="Arial"/>
+                <a:ea typeface="Arial"/>
+                <a:cs typeface="Arial"/>
+                <a:sym typeface="Arial"/>
+              </a:defRPr>
+            </a:lvl7pPr>
+            <a:lvl8pPr marR="0" lvl="7" algn="l" rtl="0">
+              <a:lnSpc>
+                <a:spcPct val="100000"/>
+              </a:lnSpc>
+              <a:spcBef>
+                <a:spcPts val="0"/>
+              </a:spcBef>
+              <a:spcAft>
+                <a:spcPts val="0"/>
+              </a:spcAft>
+              <a:buClr>
+                <a:srgbClr val="000000"/>
+              </a:buClr>
+              <a:buFont typeface="Arial"/>
+              <a:defRPr sz="1400" b="0" i="0" u="none" strike="noStrike" cap="none">
+                <a:solidFill>
+                  <a:srgbClr val="000000"/>
+                </a:solidFill>
+                <a:latin typeface="Arial"/>
+                <a:ea typeface="Arial"/>
+                <a:cs typeface="Arial"/>
+                <a:sym typeface="Arial"/>
+              </a:defRPr>
+            </a:lvl8pPr>
+            <a:lvl9pPr marR="0" lvl="8" algn="l" rtl="0">
+              <a:lnSpc>
+                <a:spcPct val="100000"/>
+              </a:lnSpc>
+              <a:spcBef>
+                <a:spcPts val="0"/>
+              </a:spcBef>
+              <a:spcAft>
+                <a:spcPts val="0"/>
+              </a:spcAft>
+              <a:buClr>
+                <a:srgbClr val="000000"/>
+              </a:buClr>
+              <a:buFont typeface="Arial"/>
+              <a:defRPr sz="1400" b="0" i="0" u="none" strike="noStrike" cap="none">
+                <a:solidFill>
+                  <a:srgbClr val="000000"/>
+                </a:solidFill>
+                <a:latin typeface="Arial"/>
+                <a:ea typeface="Arial"/>
+                <a:cs typeface="Arial"/>
+                <a:sym typeface="Arial"/>
+              </a:defRPr>
+            </a:lvl9pPr>
+          </a:lstStyle>
+          <a:p>
+            <a:pPr marL="0" lvl="0" indent="0" algn="ctr" rtl="0">
+              <a:spcBef>
+                <a:spcPts val="0"/>
+              </a:spcBef>
+              <a:spcAft>
+                <a:spcPts val="0"/>
+              </a:spcAft>
+              <a:buNone/>
+            </a:pPr>
+            <a:r>
+              <a:rPr lang="en-GB" sz="2400" b="1" dirty="0">
+                <a:solidFill>
+                  <a:schemeClr val="lt1"/>
+                </a:solidFill>
+                <a:latin typeface="Squada One"/>
+                <a:ea typeface="Squada One"/>
+                <a:cs typeface="Squada One"/>
+                <a:sym typeface="Squada One"/>
+              </a:rPr>
+              <a:t>01</a:t>
+            </a:r>
+            <a:endParaRPr sz="2400" b="1" dirty="0">
+              <a:solidFill>
+                <a:schemeClr val="dk2"/>
+              </a:solidFill>
+              <a:latin typeface="Squada One"/>
+              <a:ea typeface="Squada One"/>
+              <a:cs typeface="Squada One"/>
+              <a:sym typeface="Squada One"/>
+            </a:endParaRPr>
+          </a:p>
+        </p:txBody>
+      </p:sp>
+      <p:sp>
+        <p:nvSpPr>
+          <p:cNvPr id="7" name="TextBox 6">
+            <a:extLst>
+              <a:ext uri="{FF2B5EF4-FFF2-40B4-BE49-F238E27FC236}">
+                <a16:creationId xmlns:a16="http://schemas.microsoft.com/office/drawing/2014/main" id="{922B6717-E610-4402-A725-3F95B3950607}"/>
+              </a:ext>
+            </a:extLst>
+          </p:cNvPr>
+          <p:cNvSpPr txBox="1"/>
+          <p:nvPr/>
+        </p:nvSpPr>
+        <p:spPr>
+          <a:xfrm>
+            <a:off x="0" y="0"/>
+            <a:ext cx="2873648" cy="446276"/>
+          </a:xfrm>
+          <a:prstGeom prst="rect">
+            <a:avLst/>
+          </a:prstGeom>
+          <a:noFill/>
+        </p:spPr>
+        <p:txBody>
+          <a:bodyPr wrap="square" rtlCol="0">
+            <a:spAutoFit/>
+          </a:bodyPr>
+          <a:lstStyle/>
+          <a:p>
+            <a:r>
+              <a:rPr lang="fr-FR" sz="900" dirty="0">
+                <a:solidFill>
+                  <a:schemeClr val="bg1"/>
+                </a:solidFill>
+                <a:latin typeface="Roboto" panose="02000000000000000000" pitchFamily="2" charset="0"/>
+                <a:ea typeface="Roboto" panose="02000000000000000000" pitchFamily="2" charset="0"/>
+              </a:rPr>
+              <a:t>ALIA- Approche Logique de l'Intelligence Artificielle</a:t>
+            </a:r>
+          </a:p>
+          <a:p>
+            <a:endParaRPr lang="en-FR" dirty="0"/>
+          </a:p>
+        </p:txBody>
+      </p:sp>
+      <p:graphicFrame>
+        <p:nvGraphicFramePr>
+          <p:cNvPr id="13" name="Tableau 13">
+            <a:extLst>
+              <a:ext uri="{FF2B5EF4-FFF2-40B4-BE49-F238E27FC236}">
+                <a16:creationId xmlns:a16="http://schemas.microsoft.com/office/drawing/2014/main" id="{A3CA580E-662F-4A8A-B5EE-D79F43C32182}"/>
+              </a:ext>
+            </a:extLst>
+          </p:cNvPr>
+          <p:cNvGraphicFramePr>
+            <a:graphicFrameLocks noGrp="1"/>
+          </p:cNvGraphicFramePr>
+          <p:nvPr>
+            <p:extLst>
+              <p:ext uri="{D42A27DB-BD31-4B8C-83A1-F6EECF244321}">
+                <p14:modId xmlns:p14="http://schemas.microsoft.com/office/powerpoint/2010/main" val="890858817"/>
+              </p:ext>
+            </p:extLst>
+          </p:nvPr>
+        </p:nvGraphicFramePr>
+        <p:xfrm>
+          <a:off x="1524000" y="2161381"/>
+          <a:ext cx="6096000" cy="1384618"/>
+        </p:xfrm>
+        <a:graphic>
+          <a:graphicData uri="http://schemas.openxmlformats.org/drawingml/2006/table">
+            <a:tbl>
+              <a:tblPr firstRow="1" bandRow="1">
+                <a:tableStyleId>{93296810-A885-4BE3-A3E7-6D5BEEA58F35}</a:tableStyleId>
+              </a:tblPr>
+              <a:tblGrid>
+                <a:gridCol w="2032000">
+                  <a:extLst>
+                    <a:ext uri="{9D8B030D-6E8A-4147-A177-3AD203B41FA5}">
+                      <a16:colId xmlns:a16="http://schemas.microsoft.com/office/drawing/2014/main" val="1904091438"/>
+                    </a:ext>
+                  </a:extLst>
+                </a:gridCol>
+                <a:gridCol w="2032000">
+                  <a:extLst>
+                    <a:ext uri="{9D8B030D-6E8A-4147-A177-3AD203B41FA5}">
+                      <a16:colId xmlns:a16="http://schemas.microsoft.com/office/drawing/2014/main" val="3403444520"/>
+                    </a:ext>
+                  </a:extLst>
+                </a:gridCol>
+                <a:gridCol w="2032000">
+                  <a:extLst>
+                    <a:ext uri="{9D8B030D-6E8A-4147-A177-3AD203B41FA5}">
+                      <a16:colId xmlns:a16="http://schemas.microsoft.com/office/drawing/2014/main" val="1628638202"/>
+                    </a:ext>
+                  </a:extLst>
+                </a:gridCol>
+              </a:tblGrid>
+              <a:tr h="370840">
+                <a:tc>
+                  <a:txBody>
+                    <a:bodyPr/>
+                    <a:lstStyle/>
+                    <a:p>
+                      <a:pPr algn="ctr"/>
+                      <a:r>
+                        <a:rPr lang="fr-FR" dirty="0"/>
+                        <a:t>Profondeur</a:t>
+                      </a:r>
+                    </a:p>
+                  </a:txBody>
+                  <a:tcPr anchor="ctr"/>
+                </a:tc>
+                <a:tc>
+                  <a:txBody>
+                    <a:bodyPr/>
+                    <a:lstStyle/>
+                    <a:p>
+                      <a:pPr algn="ctr"/>
+                      <a:r>
+                        <a:rPr lang="fr-FR" dirty="0"/>
+                        <a:t>MIN-MAX</a:t>
+                      </a:r>
+                    </a:p>
+                  </a:txBody>
+                  <a:tcPr anchor="ctr"/>
+                </a:tc>
+                <a:tc>
+                  <a:txBody>
+                    <a:bodyPr/>
+                    <a:lstStyle/>
+                    <a:p>
+                      <a:pPr algn="ctr"/>
+                      <a:r>
+                        <a:rPr lang="fr-FR" dirty="0"/>
+                        <a:t>ALPHA-BETA</a:t>
+                      </a:r>
+                    </a:p>
+                  </a:txBody>
+                  <a:tcPr anchor="ctr"/>
+                </a:tc>
+                <a:extLst>
+                  <a:ext uri="{0D108BD9-81ED-4DB2-BD59-A6C34878D82A}">
+                    <a16:rowId xmlns:a16="http://schemas.microsoft.com/office/drawing/2014/main" val="1069712553"/>
+                  </a:ext>
+                </a:extLst>
+              </a:tr>
+              <a:tr h="550704">
+                <a:tc>
+                  <a:txBody>
+                    <a:bodyPr/>
+                    <a:lstStyle/>
+                    <a:p>
+                      <a:pPr algn="ctr"/>
+                      <a:r>
+                        <a:rPr lang="en-HK" b="1" dirty="0">
+                          <a:solidFill>
+                            <a:schemeClr val="accent5">
+                              <a:lumMod val="25000"/>
+                            </a:schemeClr>
+                          </a:solidFill>
+                        </a:rPr>
+                        <a:t>3</a:t>
+                      </a:r>
+                      <a:endParaRPr lang="fr-FR" b="1" dirty="0">
+                        <a:solidFill>
+                          <a:schemeClr val="accent5">
+                            <a:lumMod val="25000"/>
+                          </a:schemeClr>
+                        </a:solidFill>
+                      </a:endParaRPr>
+                    </a:p>
+                  </a:txBody>
+                  <a:tcPr anchor="ctr"/>
+                </a:tc>
+                <a:tc>
+                  <a:txBody>
+                    <a:bodyPr/>
+                    <a:lstStyle/>
+                    <a:p>
+                      <a:pPr marL="0" marR="0" lvl="0" indent="0" algn="ctr" defTabSz="914400" rtl="0" eaLnBrk="1" fontAlgn="auto" latinLnBrk="0" hangingPunct="1">
+                        <a:lnSpc>
+                          <a:spcPct val="100000"/>
+                        </a:lnSpc>
+                        <a:spcBef>
+                          <a:spcPts val="0"/>
+                        </a:spcBef>
+                        <a:spcAft>
+                          <a:spcPts val="0"/>
+                        </a:spcAft>
+                        <a:buClr>
+                          <a:srgbClr val="000000"/>
+                        </a:buClr>
+                        <a:buSzTx/>
+                        <a:buFont typeface="Arial"/>
+                        <a:buNone/>
+                        <a:tabLst/>
+                        <a:defRPr/>
+                      </a:pPr>
+                      <a:r>
+                        <a:rPr lang="fr-FR" sz="1100" dirty="0"/>
+                        <a:t>83 Victoires, 15 Défaites et 2 Egalités en 7.6 sec</a:t>
+                      </a:r>
+                    </a:p>
+                  </a:txBody>
+                  <a:tcPr anchor="ctr"/>
+                </a:tc>
+                <a:tc>
+                  <a:txBody>
+                    <a:bodyPr/>
+                    <a:lstStyle/>
+                    <a:p>
+                      <a:pPr algn="ctr"/>
+                      <a:r>
+                        <a:rPr lang="fr-FR" sz="1100" dirty="0"/>
+                        <a:t>61 Victoires, 37 défaites et 2 Egalités en 1.5 sec</a:t>
+                      </a:r>
+                    </a:p>
+                  </a:txBody>
+                  <a:tcPr anchor="ctr"/>
+                </a:tc>
+                <a:extLst>
+                  <a:ext uri="{0D108BD9-81ED-4DB2-BD59-A6C34878D82A}">
+                    <a16:rowId xmlns:a16="http://schemas.microsoft.com/office/drawing/2014/main" val="1405622518"/>
+                  </a:ext>
+                </a:extLst>
+              </a:tr>
+              <a:tr h="463074">
+                <a:tc>
+                  <a:txBody>
+                    <a:bodyPr/>
+                    <a:lstStyle/>
+                    <a:p>
+                      <a:pPr algn="ctr"/>
+                      <a:r>
+                        <a:rPr lang="en-HK" b="1" dirty="0">
+                          <a:solidFill>
+                            <a:schemeClr val="accent5">
+                              <a:lumMod val="25000"/>
+                            </a:schemeClr>
+                          </a:solidFill>
+                        </a:rPr>
+                        <a:t>4</a:t>
+                      </a:r>
+                      <a:endParaRPr lang="fr-FR" b="1" dirty="0">
+                        <a:solidFill>
+                          <a:schemeClr val="accent5">
+                            <a:lumMod val="25000"/>
+                          </a:schemeClr>
+                        </a:solidFill>
+                      </a:endParaRPr>
+                    </a:p>
+                  </a:txBody>
+                  <a:tcPr anchor="ctr"/>
+                </a:tc>
+                <a:tc>
+                  <a:txBody>
+                    <a:bodyPr/>
+                    <a:lstStyle/>
+                    <a:p>
+                      <a:pPr algn="ctr"/>
+                      <a:r>
+                        <a:rPr lang="fr-FR" sz="1100" dirty="0"/>
+                        <a:t>Impossible (stack </a:t>
+                      </a:r>
+                      <a:r>
+                        <a:rPr lang="fr-FR" sz="1100" dirty="0" err="1"/>
+                        <a:t>overflow</a:t>
+                      </a:r>
+                      <a:r>
+                        <a:rPr lang="fr-FR" sz="1100" dirty="0"/>
+                        <a:t>)</a:t>
+                      </a:r>
+                    </a:p>
+                  </a:txBody>
+                  <a:tcPr anchor="ctr"/>
+                </a:tc>
+                <a:tc>
+                  <a:txBody>
+                    <a:bodyPr/>
+                    <a:lstStyle/>
+                    <a:p>
+                      <a:pPr algn="ctr"/>
+                      <a:r>
+                        <a:rPr lang="fr-FR" sz="1100" dirty="0"/>
+                        <a:t>7 Victoires, 2 Défaites et 2 Egalités en 6.6 sec</a:t>
+                      </a:r>
+                    </a:p>
+                  </a:txBody>
+                  <a:tcPr anchor="ctr"/>
+                </a:tc>
+                <a:extLst>
+                  <a:ext uri="{0D108BD9-81ED-4DB2-BD59-A6C34878D82A}">
+                    <a16:rowId xmlns:a16="http://schemas.microsoft.com/office/drawing/2014/main" val="1675778381"/>
+                  </a:ext>
+                </a:extLst>
+              </a:tr>
+            </a:tbl>
+          </a:graphicData>
+        </a:graphic>
+      </p:graphicFrame>
+      <p:sp>
+        <p:nvSpPr>
+          <p:cNvPr id="14" name="Title 1">
+            <a:extLst>
+              <a:ext uri="{FF2B5EF4-FFF2-40B4-BE49-F238E27FC236}">
+                <a16:creationId xmlns:a16="http://schemas.microsoft.com/office/drawing/2014/main" id="{B3B9C3A2-B31F-430C-9CE6-568046F9A7A0}"/>
+              </a:ext>
+            </a:extLst>
+          </p:cNvPr>
+          <p:cNvSpPr>
+            <a:spLocks noGrp="1"/>
+          </p:cNvSpPr>
+          <p:nvPr>
+            <p:ph type="title"/>
+          </p:nvPr>
+        </p:nvSpPr>
+        <p:spPr>
+          <a:xfrm>
+            <a:off x="62796" y="1390250"/>
+            <a:ext cx="2386013" cy="572700"/>
+          </a:xfrm>
+        </p:spPr>
+        <p:txBody>
+          <a:bodyPr/>
+          <a:lstStyle/>
+          <a:p>
+            <a:r>
+              <a:rPr lang="en-GB" dirty="0"/>
+              <a:t>Sur 100 parties: </a:t>
+            </a:r>
+          </a:p>
+        </p:txBody>
+      </p:sp>
+    </p:spTree>
+    <p:extLst>
+      <p:ext uri="{BB962C8B-B14F-4D97-AF65-F5344CB8AC3E}">
+        <p14:creationId xmlns:p14="http://schemas.microsoft.com/office/powerpoint/2010/main" val="1133669631"/>
+      </p:ext>
+    </p:extLst>
+  </p:cSld>
+  <p:clrMapOvr>
+    <a:masterClrMapping/>
+  </p:clrMapOvr>
+</p:sld>
+</file>
+
+<file path=ppt/slides/slide17.xml><?xml version="1.0" encoding="utf-8"?>
+<p:sld xmlns:a="http://schemas.openxmlformats.org/drawingml/2006/main" xmlns:r="http://schemas.openxmlformats.org/officeDocument/2006/relationships" xmlns:p="http://schemas.openxmlformats.org/presentationml/2006/main">
+  <p:cSld>
+    <p:spTree>
+      <p:nvGrpSpPr>
+        <p:cNvPr id="1" name=""/>
+        <p:cNvGrpSpPr/>
+        <p:nvPr/>
+      </p:nvGrpSpPr>
+      <p:grpSpPr>
+        <a:xfrm>
+          <a:off x="0" y="0"/>
+          <a:ext cx="0" cy="0"/>
+          <a:chOff x="0" y="0"/>
+          <a:chExt cx="0" cy="0"/>
+        </a:xfrm>
+      </p:grpSpPr>
       <p:grpSp>
         <p:nvGrpSpPr>
           <p:cNvPr id="3" name="Group 18">
@@ -21498,7 +22814,7 @@
 </p:sld>
 </file>
 
-<file path=ppt/slides/slide17.xml><?xml version="1.0" encoding="utf-8"?>
+<file path=ppt/slides/slide18.xml><?xml version="1.0" encoding="utf-8"?>
 <p:sld xmlns:a="http://schemas.openxmlformats.org/drawingml/2006/main" xmlns:r="http://schemas.openxmlformats.org/officeDocument/2006/relationships" xmlns:p="http://schemas.openxmlformats.org/presentationml/2006/main">
   <p:cSld>
     <p:spTree>
@@ -23744,7 +25060,7 @@
 </p:sld>
 </file>
 
-<file path=ppt/slides/slide18.xml><?xml version="1.0" encoding="utf-8"?>
+<file path=ppt/slides/slide19.xml><?xml version="1.0" encoding="utf-8"?>
 <p:sld xmlns:a="http://schemas.openxmlformats.org/drawingml/2006/main" xmlns:r="http://schemas.openxmlformats.org/officeDocument/2006/relationships" xmlns:p="http://schemas.openxmlformats.org/presentationml/2006/main">
   <p:cSld>
     <p:spTree>

</xml_diff>